<commit_message>
add wiki, stackoverflow ref add
</commit_message>
<xml_diff>
--- a/2차원 표준정규분포 확률밀도함수 그리기.pptx
+++ b/2차원 표준정규분포 확률밀도함수 그리기.pptx
@@ -4672,8 +4672,8 @@
         </p:blipFill>
         <p:spPr>
           <a:xfrm>
-            <a:off x="-1" y="-1"/>
-            <a:ext cx="12042475" cy="5872565"/>
+            <a:off x="0" y="-1"/>
+            <a:ext cx="12059728" cy="5872565"/>
           </a:xfrm>
           <a:prstGeom prst="rect">
             <a:avLst/>
@@ -4810,6 +4810,84 @@
           </a:prstGeom>
         </p:spPr>
       </p:pic>
+      <p:sp>
+        <p:nvSpPr>
+          <p:cNvPr id="2" name="TextBox 1"/>
+          <p:cNvSpPr txBox="1"/>
+          <p:nvPr/>
+        </p:nvSpPr>
+        <p:spPr>
+          <a:xfrm>
+            <a:off x="9420045" y="5171288"/>
+            <a:ext cx="1982017" cy="400110"/>
+          </a:xfrm>
+          <a:prstGeom prst="rect">
+            <a:avLst/>
+          </a:prstGeom>
+          <a:noFill/>
+        </p:spPr>
+        <p:txBody>
+          <a:bodyPr wrap="none" rtlCol="0">
+            <a:spAutoFit/>
+          </a:bodyPr>
+          <a:lstStyle/>
+          <a:p>
+            <a:r>
+              <a:rPr lang="en-US" sz="2000" dirty="0" smtClean="0">
+                <a:latin typeface="Arial Black" charset="0"/>
+                <a:ea typeface="Arial Black" charset="0"/>
+                <a:cs typeface="Arial Black" charset="0"/>
+                <a:hlinkClick r:id="rId6"/>
+              </a:rPr>
+              <a:t>stakoverflow</a:t>
+            </a:r>
+            <a:endParaRPr lang="en-US" sz="2000" dirty="0">
+              <a:latin typeface="Arial Black" charset="0"/>
+              <a:ea typeface="Arial Black" charset="0"/>
+              <a:cs typeface="Arial Black" charset="0"/>
+            </a:endParaRPr>
+          </a:p>
+        </p:txBody>
+      </p:sp>
+      <p:sp>
+        <p:nvSpPr>
+          <p:cNvPr id="4" name="TextBox 3"/>
+          <p:cNvSpPr txBox="1"/>
+          <p:nvPr/>
+        </p:nvSpPr>
+        <p:spPr>
+          <a:xfrm>
+            <a:off x="9606366" y="6404790"/>
+            <a:ext cx="768159" cy="400110"/>
+          </a:xfrm>
+          <a:prstGeom prst="rect">
+            <a:avLst/>
+          </a:prstGeom>
+          <a:noFill/>
+        </p:spPr>
+        <p:txBody>
+          <a:bodyPr wrap="none" rtlCol="0">
+            <a:spAutoFit/>
+          </a:bodyPr>
+          <a:lstStyle/>
+          <a:p>
+            <a:r>
+              <a:rPr lang="en-US" sz="2000" dirty="0" smtClean="0">
+                <a:latin typeface="Arial Black" charset="0"/>
+                <a:ea typeface="Arial Black" charset="0"/>
+                <a:cs typeface="Arial Black" charset="0"/>
+                <a:hlinkClick r:id="rId7"/>
+              </a:rPr>
+              <a:t>wiki</a:t>
+            </a:r>
+            <a:endParaRPr lang="en-US" sz="2000" dirty="0">
+              <a:latin typeface="Arial Black" charset="0"/>
+              <a:ea typeface="Arial Black" charset="0"/>
+              <a:cs typeface="Arial Black" charset="0"/>
+            </a:endParaRPr>
+          </a:p>
+        </p:txBody>
+      </p:sp>
     </p:spTree>
     <p:extLst>
       <p:ext uri="{BB962C8B-B14F-4D97-AF65-F5344CB8AC3E}">

</xml_diff>